<commit_message>
first try for simple NN and create dataset for function curves
</commit_message>
<xml_diff>
--- a/presentation/QCP_stocks_21.11.23.pptx
+++ b/presentation/QCP_stocks_21.11.23.pptx
@@ -5455,20 +5455,8 @@
           </a:p>
           <a:p>
             <a:r>
-              <a:rPr lang="en-GB"/>
-              <a:t>Test </a:t>
-            </a:r>
-            <a:r>
               <a:rPr lang="en-GB" dirty="0"/>
-              <a:t>K</a:t>
-            </a:r>
-            <a:r>
-              <a:rPr lang="en-GB"/>
-              <a:t>alman </a:t>
-            </a:r>
-            <a:r>
-              <a:rPr lang="en-GB" dirty="0"/>
-              <a:t>filter to handle noise</a:t>
+              <a:t>Test Kalman filter to handle noise</a:t>
             </a:r>
           </a:p>
           <a:p>

</xml_diff>